<commit_message>
UPDATE: CPS part done
</commit_message>
<xml_diff>
--- a/thesis/state_of_the_art_presentation/2018.01.17_SotA_presCZ.pptx
+++ b/thesis/state_of_the_art_presentation/2018.01.17_SotA_presCZ.pptx
@@ -13,31 +13,33 @@
     <p:sldId id="261" r:id="rId7"/>
     <p:sldId id="262" r:id="rId8"/>
     <p:sldId id="263" r:id="rId9"/>
-    <p:sldId id="264" r:id="rId10"/>
-    <p:sldId id="265" r:id="rId11"/>
-    <p:sldId id="268" r:id="rId12"/>
-    <p:sldId id="269" r:id="rId13"/>
-    <p:sldId id="271" r:id="rId14"/>
-    <p:sldId id="272" r:id="rId15"/>
-    <p:sldId id="273" r:id="rId16"/>
-    <p:sldId id="274" r:id="rId17"/>
-    <p:sldId id="275" r:id="rId18"/>
-    <p:sldId id="276" r:id="rId19"/>
-    <p:sldId id="277" r:id="rId20"/>
+    <p:sldId id="279" r:id="rId10"/>
+    <p:sldId id="278" r:id="rId11"/>
+    <p:sldId id="264" r:id="rId12"/>
+    <p:sldId id="265" r:id="rId13"/>
+    <p:sldId id="268" r:id="rId14"/>
+    <p:sldId id="269" r:id="rId15"/>
+    <p:sldId id="271" r:id="rId16"/>
+    <p:sldId id="272" r:id="rId17"/>
+    <p:sldId id="273" r:id="rId18"/>
+    <p:sldId id="274" r:id="rId19"/>
+    <p:sldId id="275" r:id="rId20"/>
+    <p:sldId id="276" r:id="rId21"/>
+    <p:sldId id="277" r:id="rId22"/>
   </p:sldIdLst>
   <p:sldSz cx="9144000" cy="6858000" type="screen4x3"/>
   <p:notesSz cx="6858000" cy="9144000"/>
   <p:embeddedFontLst>
     <p:embeddedFont>
       <p:font typeface="Technika-Bold" panose="00000600000000000000" charset="-18"/>
-      <p:regular r:id="rId21"/>
+      <p:regular r:id="rId23"/>
     </p:embeddedFont>
     <p:embeddedFont>
       <p:font typeface="Technika" panose="020B0604020202020204" charset="-18"/>
-      <p:regular r:id="rId22"/>
-      <p:bold r:id="rId23"/>
-      <p:italic r:id="rId24"/>
-      <p:boldItalic r:id="rId25"/>
+      <p:regular r:id="rId24"/>
+      <p:bold r:id="rId25"/>
+      <p:italic r:id="rId26"/>
+      <p:boldItalic r:id="rId27"/>
     </p:embeddedFont>
   </p:embeddedFontLst>
   <p:defaultTextStyle>
@@ -141,6 +143,10 @@
     </p:ext>
   </p:extLst>
 </p:presentation>
+</file>
+
+<file path=ppt/revisionInfo.xml><?xml version="1.0" encoding="utf-8"?>
+<p1510:revInfo xmlns:a="http://schemas.openxmlformats.org/drawingml/2006/main" xmlns:r="http://schemas.openxmlformats.org/officeDocument/2006/relationships" xmlns:p1510="http://schemas.microsoft.com/office/powerpoint/2015/10/main"/>
 </file>
 
 <file path=ppt/slideLayouts/slideLayout1.xml><?xml version="1.0" encoding="utf-8"?>
@@ -1481,22 +1487,27 @@
             <p:ph type="title"/>
           </p:nvPr>
         </p:nvSpPr>
-        <p:spPr/>
+        <p:spPr>
+          <a:xfrm>
+            <a:off x="1080000" y="1800000"/>
+            <a:ext cx="7794000" cy="742568"/>
+          </a:xfrm>
+        </p:spPr>
         <p:txBody>
           <a:bodyPr/>
           <a:lstStyle/>
           <a:p>
             <a:r>
-              <a:rPr lang="cs-CZ" dirty="0"/>
-              <a:t>Příklady modelů </a:t>
+              <a:rPr lang="en-US" dirty="0" err="1"/>
+              <a:t>Kyber-fyzik</a:t>
             </a:r>
             <a:r>
               <a:rPr lang="cs-CZ" dirty="0" err="1"/>
-              <a:t>Kyber</a:t>
-            </a:r>
-            <a:r>
-              <a:rPr lang="cs-CZ" dirty="0"/>
-              <a:t>-fyzikálních systémů</a:t>
+              <a:t>ální</a:t>
+            </a:r>
+            <a:r>
+              <a:rPr lang="cs-CZ" dirty="0"/>
+              <a:t> systémy</a:t>
             </a:r>
           </a:p>
         </p:txBody>
@@ -1519,24 +1530,64 @@
         </p:nvSpPr>
         <p:spPr>
           <a:xfrm>
-            <a:off x="1079999" y="3059766"/>
+            <a:off x="1080000" y="2542568"/>
             <a:ext cx="7794000" cy="3528000"/>
           </a:xfrm>
         </p:spPr>
         <p:txBody>
-          <a:bodyPr/>
-          <a:lstStyle/>
-          <a:p>
+          <a:bodyPr>
+            <a:normAutofit/>
+          </a:bodyPr>
+          <a:lstStyle/>
+          <a:p>
+            <a:r>
+              <a:rPr lang="en-US" dirty="0"/>
+              <a:t>P</a:t>
+            </a:r>
+            <a:r>
+              <a:rPr lang="cs-CZ" dirty="0" err="1"/>
+              <a:t>říklady</a:t>
+            </a:r>
             <a:endParaRPr lang="cs-CZ" dirty="0"/>
+          </a:p>
+          <a:p>
+            <a:pPr marL="457200" indent="-457200">
+              <a:buFont typeface="+mj-lt"/>
+              <a:buAutoNum type="arabicPeriod"/>
+            </a:pPr>
+            <a:r>
+              <a:rPr lang="cs-CZ" dirty="0"/>
+              <a:t>Elektrické sítě s pokročilým monitoringem</a:t>
+            </a:r>
+          </a:p>
+          <a:p>
+            <a:pPr marL="457200" indent="-457200">
+              <a:buFont typeface="+mj-lt"/>
+              <a:buAutoNum type="arabicPeriod"/>
+            </a:pPr>
+            <a:r>
+              <a:rPr lang="cs-CZ" dirty="0"/>
+              <a:t>Propojená autonomní vozidla</a:t>
+            </a:r>
+          </a:p>
+          <a:p>
+            <a:pPr marL="457200" indent="-457200">
+              <a:buFont typeface="+mj-lt"/>
+              <a:buAutoNum type="arabicPeriod"/>
+            </a:pPr>
+            <a:r>
+              <a:rPr lang="cs-CZ" dirty="0"/>
+              <a:t>Protézy, jako například nervově ovládaná umělá dolní končetina</a:t>
+            </a:r>
           </a:p>
         </p:txBody>
       </p:sp>
       <p:pic>
         <p:nvPicPr>
-          <p:cNvPr id="4" name="Grafický objekt 3" descr="Síť">
-            <a:extLst>
-              <a:ext uri="{FF2B5EF4-FFF2-40B4-BE49-F238E27FC236}">
-                <a16:creationId xmlns:a16="http://schemas.microsoft.com/office/drawing/2014/main" id="{A2C25B1F-BFDD-402A-9F5B-95FAF7C81B95}"/>
+          <p:cNvPr id="5" name="Grafický objekt 4" descr="Přehrávač DVD">
+            <a:extLst>
+              <a:ext uri="{FF2B5EF4-FFF2-40B4-BE49-F238E27FC236}">
+                <a16:creationId xmlns:a16="http://schemas.microsoft.com/office/drawing/2014/main" id="{1C05C4EF-711C-4C62-92EC-A28B5A39F975}"/>
               </a:ext>
             </a:extLst>
           </p:cNvPr>
@@ -1562,8 +1613,44 @@
         </p:blipFill>
         <p:spPr>
           <a:xfrm>
-            <a:off x="165599" y="1429567"/>
+            <a:off x="165599" y="1628168"/>
             <a:ext cx="914400" cy="914400"/>
+          </a:xfrm>
+          <a:prstGeom prst="rect">
+            <a:avLst/>
+          </a:prstGeom>
+        </p:spPr>
+      </p:pic>
+      <p:pic>
+        <p:nvPicPr>
+          <p:cNvPr id="6" name="Obrázek 5">
+            <a:extLst>
+              <a:ext uri="{FF2B5EF4-FFF2-40B4-BE49-F238E27FC236}">
+                <a16:creationId xmlns:a16="http://schemas.microsoft.com/office/drawing/2014/main" id="{440A1799-6A13-4A43-97E7-085A44D11EC7}"/>
+              </a:ext>
+            </a:extLst>
+          </p:cNvPr>
+          <p:cNvPicPr>
+            <a:picLocks noChangeAspect="1"/>
+          </p:cNvPicPr>
+          <p:nvPr/>
+        </p:nvPicPr>
+        <p:blipFill>
+          <a:blip r:embed="rId4">
+            <a:extLst>
+              <a:ext uri="{28A0092B-C50C-407E-A947-70E740481C1C}">
+                <a14:useLocalDpi xmlns:a14="http://schemas.microsoft.com/office/drawing/2010/main" val="0"/>
+              </a:ext>
+            </a:extLst>
+          </a:blip>
+          <a:stretch>
+            <a:fillRect/>
+          </a:stretch>
+        </p:blipFill>
+        <p:spPr>
+          <a:xfrm>
+            <a:off x="3283827" y="4403842"/>
+            <a:ext cx="4780173" cy="1858956"/>
           </a:xfrm>
           <a:prstGeom prst="rect">
             <a:avLst/>
@@ -1573,7 +1660,7 @@
     </p:spTree>
     <p:extLst>
       <p:ext uri="{BB962C8B-B14F-4D97-AF65-F5344CB8AC3E}">
-        <p14:creationId xmlns:p14="http://schemas.microsoft.com/office/powerpoint/2010/main" val="1213232024"/>
+        <p14:creationId xmlns:p14="http://schemas.microsoft.com/office/powerpoint/2010/main" val="3735776811"/>
       </p:ext>
     </p:extLst>
   </p:cSld>
@@ -1623,7 +1710,15 @@
           <a:p>
             <a:r>
               <a:rPr lang="cs-CZ" dirty="0"/>
-              <a:t>Testování modelů (TLS)</a:t>
+              <a:t>Modelování </a:t>
+            </a:r>
+            <a:r>
+              <a:rPr lang="cs-CZ" dirty="0" err="1"/>
+              <a:t>Kyber</a:t>
+            </a:r>
+            <a:r>
+              <a:rPr lang="cs-CZ" dirty="0"/>
+              <a:t>-fyzikálních systémů</a:t>
             </a:r>
           </a:p>
         </p:txBody>
@@ -1656,26 +1751,33 @@
           <a:p>
             <a:r>
               <a:rPr lang="cs-CZ" dirty="0"/>
-              <a:t>Definice</a:t>
-            </a:r>
-          </a:p>
-          <a:p>
+              <a:t>Model </a:t>
+            </a:r>
+            <a:r>
+              <a:rPr lang="cs-CZ" dirty="0" err="1"/>
+              <a:t>driven</a:t>
+            </a:r>
+            <a:r>
+              <a:rPr lang="cs-CZ" dirty="0"/>
+              <a:t> </a:t>
+            </a:r>
+            <a:r>
+              <a:rPr lang="cs-CZ" dirty="0" err="1"/>
+              <a:t>developement</a:t>
+            </a:r>
             <a:endParaRPr lang="cs-CZ" dirty="0"/>
           </a:p>
           <a:p>
-            <a:r>
-              <a:rPr lang="cs-CZ" dirty="0"/>
-              <a:t>Příklady</a:t>
-            </a:r>
+            <a:endParaRPr lang="cs-CZ" dirty="0"/>
           </a:p>
         </p:txBody>
       </p:sp>
       <p:pic>
         <p:nvPicPr>
-          <p:cNvPr id="5" name="Zástupný symbol pro obsah 4" descr="Kontrolní seznam">
-            <a:extLst>
-              <a:ext uri="{FF2B5EF4-FFF2-40B4-BE49-F238E27FC236}">
-                <a16:creationId xmlns:a16="http://schemas.microsoft.com/office/drawing/2014/main" id="{03AE1425-0900-428C-B825-7FFFD5F58223}"/>
+          <p:cNvPr id="8" name="Grafický objekt 7" descr="Síť">
+            <a:extLst>
+              <a:ext uri="{FF2B5EF4-FFF2-40B4-BE49-F238E27FC236}">
+                <a16:creationId xmlns:a16="http://schemas.microsoft.com/office/drawing/2014/main" id="{2C544BB0-C07E-478B-A808-F225DDA180B4}"/>
               </a:ext>
             </a:extLst>
           </p:cNvPr>
@@ -1701,7 +1803,7 @@
         </p:blipFill>
         <p:spPr>
           <a:xfrm>
-            <a:off x="165600" y="1342800"/>
+            <a:off x="165599" y="1429567"/>
             <a:ext cx="914400" cy="914400"/>
           </a:xfrm>
           <a:prstGeom prst="rect">
@@ -1712,7 +1814,7 @@
     </p:spTree>
     <p:extLst>
       <p:ext uri="{BB962C8B-B14F-4D97-AF65-F5344CB8AC3E}">
-        <p14:creationId xmlns:p14="http://schemas.microsoft.com/office/powerpoint/2010/main" val="1536725085"/>
+        <p14:creationId xmlns:p14="http://schemas.microsoft.com/office/powerpoint/2010/main" val="498899578"/>
       </p:ext>
     </p:extLst>
   </p:cSld>
@@ -1762,7 +1864,15 @@
           <a:p>
             <a:r>
               <a:rPr lang="cs-CZ" dirty="0"/>
-              <a:t>Testování modelů (MTL)</a:t>
+              <a:t>Příklady modelů </a:t>
+            </a:r>
+            <a:r>
+              <a:rPr lang="cs-CZ" dirty="0" err="1"/>
+              <a:t>Kyber</a:t>
+            </a:r>
+            <a:r>
+              <a:rPr lang="cs-CZ" dirty="0"/>
+              <a:t>-fyzikálních systémů</a:t>
             </a:r>
           </a:p>
         </p:txBody>
@@ -1793,28 +1903,16 @@
           <a:bodyPr/>
           <a:lstStyle/>
           <a:p>
-            <a:r>
-              <a:rPr lang="cs-CZ" dirty="0"/>
-              <a:t>Definice</a:t>
-            </a:r>
-          </a:p>
-          <a:p>
             <a:endParaRPr lang="cs-CZ" dirty="0"/>
-          </a:p>
-          <a:p>
-            <a:r>
-              <a:rPr lang="cs-CZ" dirty="0"/>
-              <a:t>Příklady</a:t>
-            </a:r>
           </a:p>
         </p:txBody>
       </p:sp>
       <p:pic>
         <p:nvPicPr>
-          <p:cNvPr id="5" name="Zástupný symbol pro obsah 4" descr="Kontrolní seznam">
-            <a:extLst>
-              <a:ext uri="{FF2B5EF4-FFF2-40B4-BE49-F238E27FC236}">
-                <a16:creationId xmlns:a16="http://schemas.microsoft.com/office/drawing/2014/main" id="{03AE1425-0900-428C-B825-7FFFD5F58223}"/>
+          <p:cNvPr id="4" name="Grafický objekt 3" descr="Síť">
+            <a:extLst>
+              <a:ext uri="{FF2B5EF4-FFF2-40B4-BE49-F238E27FC236}">
+                <a16:creationId xmlns:a16="http://schemas.microsoft.com/office/drawing/2014/main" id="{A2C25B1F-BFDD-402A-9F5B-95FAF7C81B95}"/>
               </a:ext>
             </a:extLst>
           </p:cNvPr>
@@ -1840,7 +1938,7 @@
         </p:blipFill>
         <p:spPr>
           <a:xfrm>
-            <a:off x="165600" y="1342800"/>
+            <a:off x="165599" y="1429567"/>
             <a:ext cx="914400" cy="914400"/>
           </a:xfrm>
           <a:prstGeom prst="rect">
@@ -1851,7 +1949,7 @@
     </p:spTree>
     <p:extLst>
       <p:ext uri="{BB962C8B-B14F-4D97-AF65-F5344CB8AC3E}">
-        <p14:creationId xmlns:p14="http://schemas.microsoft.com/office/powerpoint/2010/main" val="2238727566"/>
+        <p14:creationId xmlns:p14="http://schemas.microsoft.com/office/powerpoint/2010/main" val="1213232024"/>
       </p:ext>
     </p:extLst>
   </p:cSld>
@@ -1901,23 +1999,7 @@
           <a:p>
             <a:r>
               <a:rPr lang="cs-CZ" dirty="0"/>
-              <a:t>S-</a:t>
-            </a:r>
-            <a:r>
-              <a:rPr lang="cs-CZ" dirty="0" err="1"/>
-              <a:t>Taliro</a:t>
-            </a:r>
-            <a:r>
-              <a:rPr lang="cs-CZ" dirty="0"/>
-              <a:t> </a:t>
-            </a:r>
-            <a:r>
-              <a:rPr lang="cs-CZ" dirty="0" err="1"/>
-              <a:t>tools</a:t>
-            </a:r>
-            <a:r>
-              <a:rPr lang="cs-CZ" dirty="0"/>
-              <a:t> (úvod)</a:t>
+              <a:t>Testování modelů (TLS)</a:t>
             </a:r>
           </a:p>
         </p:txBody>
@@ -1959,17 +2041,17 @@
           <a:p>
             <a:r>
               <a:rPr lang="cs-CZ" dirty="0"/>
-              <a:t>Příklady (video/manuál)</a:t>
+              <a:t>Příklady</a:t>
             </a:r>
           </a:p>
         </p:txBody>
       </p:sp>
       <p:pic>
         <p:nvPicPr>
-          <p:cNvPr id="6" name="Zástupný symbol pro obsah 4" descr="Stoupající trend">
-            <a:extLst>
-              <a:ext uri="{FF2B5EF4-FFF2-40B4-BE49-F238E27FC236}">
-                <a16:creationId xmlns:a16="http://schemas.microsoft.com/office/drawing/2014/main" id="{0B404680-BD46-4C51-B5EE-F1DBA615D1C3}"/>
+          <p:cNvPr id="5" name="Zástupný symbol pro obsah 4" descr="Kontrolní seznam">
+            <a:extLst>
+              <a:ext uri="{FF2B5EF4-FFF2-40B4-BE49-F238E27FC236}">
+                <a16:creationId xmlns:a16="http://schemas.microsoft.com/office/drawing/2014/main" id="{03AE1425-0900-428C-B825-7FFFD5F58223}"/>
               </a:ext>
             </a:extLst>
           </p:cNvPr>
@@ -1995,7 +2077,7 @@
         </p:blipFill>
         <p:spPr>
           <a:xfrm>
-            <a:off x="165600" y="1429567"/>
+            <a:off x="165600" y="1342800"/>
             <a:ext cx="914400" cy="914400"/>
           </a:xfrm>
           <a:prstGeom prst="rect">
@@ -2006,7 +2088,7 @@
     </p:spTree>
     <p:extLst>
       <p:ext uri="{BB962C8B-B14F-4D97-AF65-F5344CB8AC3E}">
-        <p14:creationId xmlns:p14="http://schemas.microsoft.com/office/powerpoint/2010/main" val="330013582"/>
+        <p14:creationId xmlns:p14="http://schemas.microsoft.com/office/powerpoint/2010/main" val="1536725085"/>
       </p:ext>
     </p:extLst>
   </p:cSld>
@@ -2056,31 +2138,7 @@
           <a:p>
             <a:r>
               <a:rPr lang="cs-CZ" dirty="0"/>
-              <a:t>S-</a:t>
-            </a:r>
-            <a:r>
-              <a:rPr lang="cs-CZ" dirty="0" err="1"/>
-              <a:t>Taliro</a:t>
-            </a:r>
-            <a:r>
-              <a:rPr lang="cs-CZ" dirty="0"/>
-              <a:t> </a:t>
-            </a:r>
-            <a:r>
-              <a:rPr lang="cs-CZ" dirty="0" err="1"/>
-              <a:t>tools</a:t>
-            </a:r>
-            <a:r>
-              <a:rPr lang="cs-CZ" dirty="0"/>
-              <a:t> (</a:t>
-            </a:r>
-            <a:r>
-              <a:rPr lang="cs-CZ" dirty="0" err="1"/>
-              <a:t>principles</a:t>
-            </a:r>
-            <a:r>
-              <a:rPr lang="cs-CZ" dirty="0"/>
-              <a:t>)</a:t>
+              <a:t>Testování modelů (MTL)</a:t>
             </a:r>
           </a:p>
         </p:txBody>
@@ -2113,15 +2171,7 @@
           <a:p>
             <a:r>
               <a:rPr lang="cs-CZ" dirty="0"/>
-              <a:t>Graf jak S-</a:t>
-            </a:r>
-            <a:r>
-              <a:rPr lang="cs-CZ" dirty="0" err="1"/>
-              <a:t>Taliro</a:t>
-            </a:r>
-            <a:r>
-              <a:rPr lang="cs-CZ" dirty="0"/>
-              <a:t> pracuje</a:t>
+              <a:t>Definice</a:t>
             </a:r>
           </a:p>
           <a:p>
@@ -2130,17 +2180,17 @@
           <a:p>
             <a:r>
               <a:rPr lang="cs-CZ" dirty="0"/>
-              <a:t>Proč je tak těžké ověřit MTL specifikaci?</a:t>
+              <a:t>Příklady</a:t>
             </a:r>
           </a:p>
         </p:txBody>
       </p:sp>
       <p:pic>
         <p:nvPicPr>
-          <p:cNvPr id="6" name="Zástupný symbol pro obsah 4" descr="Stoupající trend">
-            <a:extLst>
-              <a:ext uri="{FF2B5EF4-FFF2-40B4-BE49-F238E27FC236}">
-                <a16:creationId xmlns:a16="http://schemas.microsoft.com/office/drawing/2014/main" id="{0B404680-BD46-4C51-B5EE-F1DBA615D1C3}"/>
+          <p:cNvPr id="5" name="Zástupný symbol pro obsah 4" descr="Kontrolní seznam">
+            <a:extLst>
+              <a:ext uri="{FF2B5EF4-FFF2-40B4-BE49-F238E27FC236}">
+                <a16:creationId xmlns:a16="http://schemas.microsoft.com/office/drawing/2014/main" id="{03AE1425-0900-428C-B825-7FFFD5F58223}"/>
               </a:ext>
             </a:extLst>
           </p:cNvPr>
@@ -2166,7 +2216,7 @@
         </p:blipFill>
         <p:spPr>
           <a:xfrm>
-            <a:off x="165600" y="1429567"/>
+            <a:off x="165600" y="1342800"/>
             <a:ext cx="914400" cy="914400"/>
           </a:xfrm>
           <a:prstGeom prst="rect">
@@ -2177,7 +2227,7 @@
     </p:spTree>
     <p:extLst>
       <p:ext uri="{BB962C8B-B14F-4D97-AF65-F5344CB8AC3E}">
-        <p14:creationId xmlns:p14="http://schemas.microsoft.com/office/powerpoint/2010/main" val="3896376582"/>
+        <p14:creationId xmlns:p14="http://schemas.microsoft.com/office/powerpoint/2010/main" val="2238727566"/>
       </p:ext>
     </p:extLst>
   </p:cSld>
@@ -2243,15 +2293,7 @@
             </a:r>
             <a:r>
               <a:rPr lang="cs-CZ" dirty="0"/>
-              <a:t> (</a:t>
-            </a:r>
-            <a:r>
-              <a:rPr lang="cs-CZ" dirty="0" err="1"/>
-              <a:t>benchmarks</a:t>
-            </a:r>
-            <a:r>
-              <a:rPr lang="cs-CZ" dirty="0"/>
-              <a:t>)</a:t>
+              <a:t> (úvod)</a:t>
             </a:r>
           </a:p>
         </p:txBody>
@@ -2283,20 +2325,8 @@
           <a:lstStyle/>
           <a:p>
             <a:r>
-              <a:rPr lang="cs-CZ" dirty="0" err="1"/>
-              <a:t>Room</a:t>
-            </a:r>
-            <a:r>
-              <a:rPr lang="cs-CZ" dirty="0"/>
-              <a:t> </a:t>
-            </a:r>
-            <a:r>
-              <a:rPr lang="cs-CZ" dirty="0" err="1"/>
-              <a:t>heating</a:t>
-            </a:r>
-            <a:r>
-              <a:rPr lang="cs-CZ" dirty="0"/>
-              <a:t> model:</a:t>
+              <a:rPr lang="cs-CZ" dirty="0"/>
+              <a:t>Definice</a:t>
             </a:r>
           </a:p>
           <a:p>
@@ -2305,7 +2335,7 @@
           <a:p>
             <a:r>
               <a:rPr lang="cs-CZ" dirty="0"/>
-              <a:t>Video/manuální ukázka?</a:t>
+              <a:t>Příklady (video/manuál)</a:t>
             </a:r>
           </a:p>
         </p:txBody>
@@ -2352,7 +2382,7 @@
     </p:spTree>
     <p:extLst>
       <p:ext uri="{BB962C8B-B14F-4D97-AF65-F5344CB8AC3E}">
-        <p14:creationId xmlns:p14="http://schemas.microsoft.com/office/powerpoint/2010/main" val="2335145583"/>
+        <p14:creationId xmlns:p14="http://schemas.microsoft.com/office/powerpoint/2010/main" val="330013582"/>
       </p:ext>
     </p:extLst>
   </p:cSld>
@@ -2402,11 +2432,27 @@
           <a:p>
             <a:r>
               <a:rPr lang="cs-CZ" dirty="0"/>
-              <a:t>Můj výzkum (</a:t>
+              <a:t>S-</a:t>
             </a:r>
             <a:r>
               <a:rPr lang="cs-CZ" dirty="0" err="1"/>
-              <a:t>opportunities</a:t>
+              <a:t>Taliro</a:t>
+            </a:r>
+            <a:r>
+              <a:rPr lang="cs-CZ" dirty="0"/>
+              <a:t> </a:t>
+            </a:r>
+            <a:r>
+              <a:rPr lang="cs-CZ" dirty="0" err="1"/>
+              <a:t>tools</a:t>
+            </a:r>
+            <a:r>
+              <a:rPr lang="cs-CZ" dirty="0"/>
+              <a:t> (</a:t>
+            </a:r>
+            <a:r>
+              <a:rPr lang="cs-CZ" dirty="0" err="1"/>
+              <a:t>principles</a:t>
             </a:r>
             <a:r>
               <a:rPr lang="cs-CZ" dirty="0"/>
@@ -2443,25 +2489,34 @@
           <a:p>
             <a:r>
               <a:rPr lang="cs-CZ" dirty="0"/>
-              <a:t>Black-box testing vs. </a:t>
+              <a:t>Graf jak S-</a:t>
             </a:r>
             <a:r>
               <a:rPr lang="cs-CZ" dirty="0" err="1"/>
-              <a:t>White</a:t>
-            </a:r>
-            <a:r>
-              <a:rPr lang="cs-CZ" dirty="0"/>
-              <a:t>-box testing</a:t>
+              <a:t>Taliro</a:t>
+            </a:r>
+            <a:r>
+              <a:rPr lang="cs-CZ" dirty="0"/>
+              <a:t> pracuje</a:t>
+            </a:r>
+          </a:p>
+          <a:p>
+            <a:endParaRPr lang="cs-CZ" dirty="0"/>
+          </a:p>
+          <a:p>
+            <a:r>
+              <a:rPr lang="cs-CZ" dirty="0"/>
+              <a:t>Proč je tak těžké ověřit MTL specifikaci?</a:t>
             </a:r>
           </a:p>
         </p:txBody>
       </p:sp>
       <p:pic>
         <p:nvPicPr>
-          <p:cNvPr id="5" name="Grafický objekt 4" descr="Baňka">
-            <a:extLst>
-              <a:ext uri="{FF2B5EF4-FFF2-40B4-BE49-F238E27FC236}">
-                <a16:creationId xmlns:a16="http://schemas.microsoft.com/office/drawing/2014/main" id="{00D5900B-6AA4-46B5-8C77-8E22DA3963C1}"/>
+          <p:cNvPr id="6" name="Zástupný symbol pro obsah 4" descr="Stoupající trend">
+            <a:extLst>
+              <a:ext uri="{FF2B5EF4-FFF2-40B4-BE49-F238E27FC236}">
+                <a16:creationId xmlns:a16="http://schemas.microsoft.com/office/drawing/2014/main" id="{0B404680-BD46-4C51-B5EE-F1DBA615D1C3}"/>
               </a:ext>
             </a:extLst>
           </p:cNvPr>
@@ -2487,7 +2542,7 @@
         </p:blipFill>
         <p:spPr>
           <a:xfrm>
-            <a:off x="165599" y="1427470"/>
+            <a:off x="165600" y="1429567"/>
             <a:ext cx="914400" cy="914400"/>
           </a:xfrm>
           <a:prstGeom prst="rect">
@@ -2498,7 +2553,7 @@
     </p:spTree>
     <p:extLst>
       <p:ext uri="{BB962C8B-B14F-4D97-AF65-F5344CB8AC3E}">
-        <p14:creationId xmlns:p14="http://schemas.microsoft.com/office/powerpoint/2010/main" val="2494419123"/>
+        <p14:creationId xmlns:p14="http://schemas.microsoft.com/office/powerpoint/2010/main" val="3896376582"/>
       </p:ext>
     </p:extLst>
   </p:cSld>
@@ -2548,11 +2603,27 @@
           <a:p>
             <a:r>
               <a:rPr lang="cs-CZ" dirty="0"/>
-              <a:t>Můj výzkum (Jan </a:t>
+              <a:t>S-</a:t>
             </a:r>
             <a:r>
               <a:rPr lang="cs-CZ" dirty="0" err="1"/>
-              <a:t>Kacetl</a:t>
+              <a:t>Taliro</a:t>
+            </a:r>
+            <a:r>
+              <a:rPr lang="cs-CZ" dirty="0"/>
+              <a:t> </a:t>
+            </a:r>
+            <a:r>
+              <a:rPr lang="cs-CZ" dirty="0" err="1"/>
+              <a:t>tools</a:t>
+            </a:r>
+            <a:r>
+              <a:rPr lang="cs-CZ" dirty="0"/>
+              <a:t> (</a:t>
+            </a:r>
+            <a:r>
+              <a:rPr lang="cs-CZ" dirty="0" err="1"/>
+              <a:t>benchmarks</a:t>
             </a:r>
             <a:r>
               <a:rPr lang="cs-CZ" dirty="0"/>
@@ -2588,8 +2659,20 @@
           <a:lstStyle/>
           <a:p>
             <a:r>
-              <a:rPr lang="cs-CZ" dirty="0"/>
-              <a:t>Definice</a:t>
+              <a:rPr lang="cs-CZ" dirty="0" err="1"/>
+              <a:t>Room</a:t>
+            </a:r>
+            <a:r>
+              <a:rPr lang="cs-CZ" dirty="0"/>
+              <a:t> </a:t>
+            </a:r>
+            <a:r>
+              <a:rPr lang="cs-CZ" dirty="0" err="1"/>
+              <a:t>heating</a:t>
+            </a:r>
+            <a:r>
+              <a:rPr lang="cs-CZ" dirty="0"/>
+              <a:t> model:</a:t>
             </a:r>
           </a:p>
           <a:p>
@@ -2598,17 +2681,17 @@
           <a:p>
             <a:r>
               <a:rPr lang="cs-CZ" dirty="0"/>
-              <a:t>Příklad</a:t>
+              <a:t>Video/manuální ukázka?</a:t>
             </a:r>
           </a:p>
         </p:txBody>
       </p:sp>
       <p:pic>
         <p:nvPicPr>
-          <p:cNvPr id="5" name="Grafický objekt 4" descr="Baňka">
-            <a:extLst>
-              <a:ext uri="{FF2B5EF4-FFF2-40B4-BE49-F238E27FC236}">
-                <a16:creationId xmlns:a16="http://schemas.microsoft.com/office/drawing/2014/main" id="{00D5900B-6AA4-46B5-8C77-8E22DA3963C1}"/>
+          <p:cNvPr id="6" name="Zástupný symbol pro obsah 4" descr="Stoupající trend">
+            <a:extLst>
+              <a:ext uri="{FF2B5EF4-FFF2-40B4-BE49-F238E27FC236}">
+                <a16:creationId xmlns:a16="http://schemas.microsoft.com/office/drawing/2014/main" id="{0B404680-BD46-4C51-B5EE-F1DBA615D1C3}"/>
               </a:ext>
             </a:extLst>
           </p:cNvPr>
@@ -2634,7 +2717,7 @@
         </p:blipFill>
         <p:spPr>
           <a:xfrm>
-            <a:off x="165599" y="1427470"/>
+            <a:off x="165600" y="1429567"/>
             <a:ext cx="914400" cy="914400"/>
           </a:xfrm>
           <a:prstGeom prst="rect">
@@ -2645,7 +2728,7 @@
     </p:spTree>
     <p:extLst>
       <p:ext uri="{BB962C8B-B14F-4D97-AF65-F5344CB8AC3E}">
-        <p14:creationId xmlns:p14="http://schemas.microsoft.com/office/powerpoint/2010/main" val="2574445448"/>
+        <p14:creationId xmlns:p14="http://schemas.microsoft.com/office/powerpoint/2010/main" val="2335145583"/>
       </p:ext>
     </p:extLst>
   </p:cSld>
@@ -2699,15 +2782,7 @@
             </a:r>
             <a:r>
               <a:rPr lang="cs-CZ" dirty="0" err="1"/>
-              <a:t>future</a:t>
-            </a:r>
-            <a:r>
-              <a:rPr lang="cs-CZ" dirty="0"/>
-              <a:t> </a:t>
-            </a:r>
-            <a:r>
-              <a:rPr lang="cs-CZ" dirty="0" err="1"/>
-              <a:t>work</a:t>
+              <a:t>opportunities</a:t>
             </a:r>
             <a:r>
               <a:rPr lang="cs-CZ" dirty="0"/>
@@ -2742,66 +2817,18 @@
           <a:bodyPr/>
           <a:lstStyle/>
           <a:p>
-            <a:pPr marL="457200" indent="-457200">
-              <a:buFont typeface="+mj-lt"/>
-              <a:buAutoNum type="arabicPeriod"/>
-            </a:pPr>
+            <a:r>
+              <a:rPr lang="cs-CZ" dirty="0"/>
+              <a:t>Black-box testing vs. </a:t>
+            </a:r>
             <a:r>
               <a:rPr lang="cs-CZ" dirty="0" err="1"/>
-              <a:t>Fdsfsdf</a:t>
-            </a:r>
-            <a:endParaRPr lang="cs-CZ" dirty="0"/>
-          </a:p>
-          <a:p>
-            <a:pPr marL="457200" indent="-457200">
-              <a:buFont typeface="+mj-lt"/>
-              <a:buAutoNum type="arabicPeriod"/>
-            </a:pPr>
-            <a:r>
-              <a:rPr lang="cs-CZ" dirty="0" err="1"/>
-              <a:t>Sfdsfsdf</a:t>
-            </a:r>
-            <a:endParaRPr lang="cs-CZ" dirty="0"/>
-          </a:p>
-          <a:p>
-            <a:pPr marL="457200" indent="-457200">
-              <a:buFont typeface="+mj-lt"/>
-              <a:buAutoNum type="arabicPeriod"/>
-            </a:pPr>
-            <a:r>
-              <a:rPr lang="cs-CZ" dirty="0" err="1"/>
-              <a:t>Fdsdfsd</a:t>
-            </a:r>
-            <a:endParaRPr lang="cs-CZ" dirty="0"/>
-          </a:p>
-          <a:p>
-            <a:pPr marL="457200" indent="-457200">
-              <a:buFont typeface="+mj-lt"/>
-              <a:buAutoNum type="arabicPeriod"/>
-            </a:pPr>
-            <a:r>
-              <a:rPr lang="cs-CZ" dirty="0" err="1"/>
-              <a:t>Sdfsdfs</a:t>
-            </a:r>
-            <a:endParaRPr lang="cs-CZ" dirty="0"/>
-          </a:p>
-          <a:p>
-            <a:pPr marL="457200" indent="-457200">
-              <a:buFont typeface="+mj-lt"/>
-              <a:buAutoNum type="arabicPeriod"/>
-            </a:pPr>
-            <a:r>
-              <a:rPr lang="cs-CZ" dirty="0" err="1"/>
-              <a:t>Sdfsdfs</a:t>
-            </a:r>
-            <a:endParaRPr lang="cs-CZ" dirty="0"/>
-          </a:p>
-          <a:p>
-            <a:pPr marL="457200" indent="-457200">
-              <a:buFont typeface="+mj-lt"/>
-              <a:buAutoNum type="arabicPeriod"/>
-            </a:pPr>
-            <a:endParaRPr lang="cs-CZ" dirty="0"/>
+              <a:t>White</a:t>
+            </a:r>
+            <a:r>
+              <a:rPr lang="cs-CZ" dirty="0"/>
+              <a:t>-box testing</a:t>
+            </a:r>
           </a:p>
         </p:txBody>
       </p:sp>
@@ -2847,7 +2874,7 @@
     </p:spTree>
     <p:extLst>
       <p:ext uri="{BB962C8B-B14F-4D97-AF65-F5344CB8AC3E}">
-        <p14:creationId xmlns:p14="http://schemas.microsoft.com/office/powerpoint/2010/main" val="3006018686"/>
+        <p14:creationId xmlns:p14="http://schemas.microsoft.com/office/powerpoint/2010/main" val="2494419123"/>
       </p:ext>
     </p:extLst>
   </p:cSld>
@@ -2879,7 +2906,7 @@
           <p:cNvPr id="2" name="Nadpis 1">
             <a:extLst>
               <a:ext uri="{FF2B5EF4-FFF2-40B4-BE49-F238E27FC236}">
-                <a16:creationId xmlns:a16="http://schemas.microsoft.com/office/drawing/2014/main" id="{E081B52C-DD40-471F-95B8-93DC30607D4F}"/>
+                <a16:creationId xmlns:a16="http://schemas.microsoft.com/office/drawing/2014/main" id="{227AE72A-6128-4B44-9F6A-2C756BB849D9}"/>
               </a:ext>
             </a:extLst>
           </p:cNvPr>
@@ -2887,7 +2914,7 @@
             <a:spLocks noGrp="1"/>
           </p:cNvSpPr>
           <p:nvPr>
-            <p:ph type="ctrTitle"/>
+            <p:ph type="title"/>
           </p:nvPr>
         </p:nvSpPr>
         <p:spPr/>
@@ -2895,20 +2922,27 @@
           <a:bodyPr/>
           <a:lstStyle/>
           <a:p>
-            <a:pPr algn="ctr"/>
-            <a:r>
-              <a:rPr lang="cs-CZ" dirty="0"/>
-              <a:t>Konec části I.</a:t>
-            </a:r>
-          </a:p>
-        </p:txBody>
-      </p:sp>
-      <p:sp>
-        <p:nvSpPr>
-          <p:cNvPr id="3" name="Podnadpis 2">
-            <a:extLst>
-              <a:ext uri="{FF2B5EF4-FFF2-40B4-BE49-F238E27FC236}">
-                <a16:creationId xmlns:a16="http://schemas.microsoft.com/office/drawing/2014/main" id="{C4658D4A-355F-428E-83F7-CA2062E8C356}"/>
+            <a:r>
+              <a:rPr lang="cs-CZ" dirty="0"/>
+              <a:t>Můj výzkum (Jan </a:t>
+            </a:r>
+            <a:r>
+              <a:rPr lang="cs-CZ" dirty="0" err="1"/>
+              <a:t>Kacetl</a:t>
+            </a:r>
+            <a:r>
+              <a:rPr lang="cs-CZ" dirty="0"/>
+              <a:t>)</a:t>
+            </a:r>
+          </a:p>
+        </p:txBody>
+      </p:sp>
+      <p:sp>
+        <p:nvSpPr>
+          <p:cNvPr id="3" name="Zástupný symbol pro obsah 2">
+            <a:extLst>
+              <a:ext uri="{FF2B5EF4-FFF2-40B4-BE49-F238E27FC236}">
+                <a16:creationId xmlns:a16="http://schemas.microsoft.com/office/drawing/2014/main" id="{DB240D0B-819A-4F36-BBEB-1F5FA397B0CD}"/>
               </a:ext>
             </a:extLst>
           </p:cNvPr>
@@ -2916,33 +2950,78 @@
             <a:spLocks noGrp="1"/>
           </p:cNvSpPr>
           <p:nvPr>
-            <p:ph type="subTitle" idx="1"/>
+            <p:ph idx="1"/>
           </p:nvPr>
         </p:nvSpPr>
-        <p:spPr/>
+        <p:spPr>
+          <a:xfrm>
+            <a:off x="1079999" y="3059766"/>
+            <a:ext cx="7794000" cy="3528000"/>
+          </a:xfrm>
+        </p:spPr>
         <p:txBody>
           <a:bodyPr/>
           <a:lstStyle/>
           <a:p>
-            <a:pPr algn="ctr"/>
-            <a:r>
-              <a:rPr lang="cs-CZ" sz="3200" dirty="0"/>
-              <a:t>Děkuji za pozornost</a:t>
-            </a:r>
-          </a:p>
-          <a:p>
-            <a:pPr algn="ctr"/>
-            <a:r>
-              <a:rPr lang="cs-CZ" sz="2800" dirty="0"/>
-              <a:t>Dotazy?</a:t>
-            </a:r>
-          </a:p>
-        </p:txBody>
-      </p:sp>
+            <a:r>
+              <a:rPr lang="cs-CZ" dirty="0"/>
+              <a:t>Definice</a:t>
+            </a:r>
+          </a:p>
+          <a:p>
+            <a:endParaRPr lang="cs-CZ" dirty="0"/>
+          </a:p>
+          <a:p>
+            <a:r>
+              <a:rPr lang="cs-CZ" dirty="0"/>
+              <a:t>Příklad</a:t>
+            </a:r>
+          </a:p>
+        </p:txBody>
+      </p:sp>
+      <p:pic>
+        <p:nvPicPr>
+          <p:cNvPr id="5" name="Grafický objekt 4" descr="Baňka">
+            <a:extLst>
+              <a:ext uri="{FF2B5EF4-FFF2-40B4-BE49-F238E27FC236}">
+                <a16:creationId xmlns:a16="http://schemas.microsoft.com/office/drawing/2014/main" id="{00D5900B-6AA4-46B5-8C77-8E22DA3963C1}"/>
+              </a:ext>
+            </a:extLst>
+          </p:cNvPr>
+          <p:cNvPicPr>
+            <a:picLocks noChangeAspect="1"/>
+          </p:cNvPicPr>
+          <p:nvPr/>
+        </p:nvPicPr>
+        <p:blipFill>
+          <a:blip r:embed="rId2">
+            <a:extLst>
+              <a:ext uri="{28A0092B-C50C-407E-A947-70E740481C1C}">
+                <a14:useLocalDpi xmlns:a14="http://schemas.microsoft.com/office/drawing/2010/main" val="0"/>
+              </a:ext>
+              <a:ext uri="{96DAC541-7B7A-43D3-8B79-37D633B846F1}">
+                <asvg:svgBlip xmlns:asvg="http://schemas.microsoft.com/office/drawing/2016/SVG/main" r:embed="rId3"/>
+              </a:ext>
+            </a:extLst>
+          </a:blip>
+          <a:stretch>
+            <a:fillRect/>
+          </a:stretch>
+        </p:blipFill>
+        <p:spPr>
+          <a:xfrm>
+            <a:off x="165599" y="1427470"/>
+            <a:ext cx="914400" cy="914400"/>
+          </a:xfrm>
+          <a:prstGeom prst="rect">
+            <a:avLst/>
+          </a:prstGeom>
+        </p:spPr>
+      </p:pic>
     </p:spTree>
     <p:extLst>
       <p:ext uri="{BB962C8B-B14F-4D97-AF65-F5344CB8AC3E}">
-        <p14:creationId xmlns:p14="http://schemas.microsoft.com/office/powerpoint/2010/main" val="542483529"/>
+        <p14:creationId xmlns:p14="http://schemas.microsoft.com/office/powerpoint/2010/main" val="2574445448"/>
       </p:ext>
     </p:extLst>
   </p:cSld>
@@ -3359,6 +3438,303 @@
     <p:extLst>
       <p:ext uri="{BB962C8B-B14F-4D97-AF65-F5344CB8AC3E}">
         <p14:creationId xmlns:p14="http://schemas.microsoft.com/office/powerpoint/2010/main" val="646610437"/>
+      </p:ext>
+    </p:extLst>
+  </p:cSld>
+  <p:clrMapOvr>
+    <a:masterClrMapping/>
+  </p:clrMapOvr>
+</p:sld>
+</file>
+
+<file path=ppt/slides/slide20.xml><?xml version="1.0" encoding="utf-8"?>
+<p:sld xmlns:a="http://schemas.openxmlformats.org/drawingml/2006/main" xmlns:r="http://schemas.openxmlformats.org/officeDocument/2006/relationships" xmlns:p="http://schemas.openxmlformats.org/presentationml/2006/main">
+  <p:cSld>
+    <p:spTree>
+      <p:nvGrpSpPr>
+        <p:cNvPr id="1" name=""/>
+        <p:cNvGrpSpPr/>
+        <p:nvPr/>
+      </p:nvGrpSpPr>
+      <p:grpSpPr>
+        <a:xfrm>
+          <a:off x="0" y="0"/>
+          <a:ext cx="0" cy="0"/>
+          <a:chOff x="0" y="0"/>
+          <a:chExt cx="0" cy="0"/>
+        </a:xfrm>
+      </p:grpSpPr>
+      <p:sp>
+        <p:nvSpPr>
+          <p:cNvPr id="2" name="Nadpis 1">
+            <a:extLst>
+              <a:ext uri="{FF2B5EF4-FFF2-40B4-BE49-F238E27FC236}">
+                <a16:creationId xmlns:a16="http://schemas.microsoft.com/office/drawing/2014/main" id="{227AE72A-6128-4B44-9F6A-2C756BB849D9}"/>
+              </a:ext>
+            </a:extLst>
+          </p:cNvPr>
+          <p:cNvSpPr>
+            <a:spLocks noGrp="1"/>
+          </p:cNvSpPr>
+          <p:nvPr>
+            <p:ph type="title"/>
+          </p:nvPr>
+        </p:nvSpPr>
+        <p:spPr/>
+        <p:txBody>
+          <a:bodyPr/>
+          <a:lstStyle/>
+          <a:p>
+            <a:r>
+              <a:rPr lang="cs-CZ" dirty="0"/>
+              <a:t>Můj výzkum (</a:t>
+            </a:r>
+            <a:r>
+              <a:rPr lang="cs-CZ" dirty="0" err="1"/>
+              <a:t>future</a:t>
+            </a:r>
+            <a:r>
+              <a:rPr lang="cs-CZ" dirty="0"/>
+              <a:t> </a:t>
+            </a:r>
+            <a:r>
+              <a:rPr lang="cs-CZ" dirty="0" err="1"/>
+              <a:t>work</a:t>
+            </a:r>
+            <a:r>
+              <a:rPr lang="cs-CZ" dirty="0"/>
+              <a:t>)</a:t>
+            </a:r>
+          </a:p>
+        </p:txBody>
+      </p:sp>
+      <p:sp>
+        <p:nvSpPr>
+          <p:cNvPr id="3" name="Zástupný symbol pro obsah 2">
+            <a:extLst>
+              <a:ext uri="{FF2B5EF4-FFF2-40B4-BE49-F238E27FC236}">
+                <a16:creationId xmlns:a16="http://schemas.microsoft.com/office/drawing/2014/main" id="{DB240D0B-819A-4F36-BBEB-1F5FA397B0CD}"/>
+              </a:ext>
+            </a:extLst>
+          </p:cNvPr>
+          <p:cNvSpPr>
+            <a:spLocks noGrp="1"/>
+          </p:cNvSpPr>
+          <p:nvPr>
+            <p:ph idx="1"/>
+          </p:nvPr>
+        </p:nvSpPr>
+        <p:spPr>
+          <a:xfrm>
+            <a:off x="1079999" y="3059766"/>
+            <a:ext cx="7794000" cy="3528000"/>
+          </a:xfrm>
+        </p:spPr>
+        <p:txBody>
+          <a:bodyPr/>
+          <a:lstStyle/>
+          <a:p>
+            <a:pPr marL="457200" indent="-457200">
+              <a:buFont typeface="+mj-lt"/>
+              <a:buAutoNum type="arabicPeriod"/>
+            </a:pPr>
+            <a:r>
+              <a:rPr lang="cs-CZ" dirty="0" err="1"/>
+              <a:t>Fdsfsdf</a:t>
+            </a:r>
+            <a:endParaRPr lang="cs-CZ" dirty="0"/>
+          </a:p>
+          <a:p>
+            <a:pPr marL="457200" indent="-457200">
+              <a:buFont typeface="+mj-lt"/>
+              <a:buAutoNum type="arabicPeriod"/>
+            </a:pPr>
+            <a:r>
+              <a:rPr lang="cs-CZ" dirty="0" err="1"/>
+              <a:t>Sfdsfsdf</a:t>
+            </a:r>
+            <a:endParaRPr lang="cs-CZ" dirty="0"/>
+          </a:p>
+          <a:p>
+            <a:pPr marL="457200" indent="-457200">
+              <a:buFont typeface="+mj-lt"/>
+              <a:buAutoNum type="arabicPeriod"/>
+            </a:pPr>
+            <a:r>
+              <a:rPr lang="cs-CZ" dirty="0" err="1"/>
+              <a:t>Fdsdfsd</a:t>
+            </a:r>
+            <a:endParaRPr lang="cs-CZ" dirty="0"/>
+          </a:p>
+          <a:p>
+            <a:pPr marL="457200" indent="-457200">
+              <a:buFont typeface="+mj-lt"/>
+              <a:buAutoNum type="arabicPeriod"/>
+            </a:pPr>
+            <a:r>
+              <a:rPr lang="cs-CZ" dirty="0" err="1"/>
+              <a:t>Sdfsdfs</a:t>
+            </a:r>
+            <a:endParaRPr lang="cs-CZ" dirty="0"/>
+          </a:p>
+          <a:p>
+            <a:pPr marL="457200" indent="-457200">
+              <a:buFont typeface="+mj-lt"/>
+              <a:buAutoNum type="arabicPeriod"/>
+            </a:pPr>
+            <a:r>
+              <a:rPr lang="cs-CZ" dirty="0" err="1"/>
+              <a:t>Sdfsdfs</a:t>
+            </a:r>
+            <a:endParaRPr lang="cs-CZ" dirty="0"/>
+          </a:p>
+          <a:p>
+            <a:pPr marL="457200" indent="-457200">
+              <a:buFont typeface="+mj-lt"/>
+              <a:buAutoNum type="arabicPeriod"/>
+            </a:pPr>
+            <a:endParaRPr lang="cs-CZ" dirty="0"/>
+          </a:p>
+        </p:txBody>
+      </p:sp>
+      <p:pic>
+        <p:nvPicPr>
+          <p:cNvPr id="5" name="Grafický objekt 4" descr="Baňka">
+            <a:extLst>
+              <a:ext uri="{FF2B5EF4-FFF2-40B4-BE49-F238E27FC236}">
+                <a16:creationId xmlns:a16="http://schemas.microsoft.com/office/drawing/2014/main" id="{00D5900B-6AA4-46B5-8C77-8E22DA3963C1}"/>
+              </a:ext>
+            </a:extLst>
+          </p:cNvPr>
+          <p:cNvPicPr>
+            <a:picLocks noChangeAspect="1"/>
+          </p:cNvPicPr>
+          <p:nvPr/>
+        </p:nvPicPr>
+        <p:blipFill>
+          <a:blip r:embed="rId2">
+            <a:extLst>
+              <a:ext uri="{28A0092B-C50C-407E-A947-70E740481C1C}">
+                <a14:useLocalDpi xmlns:a14="http://schemas.microsoft.com/office/drawing/2010/main" val="0"/>
+              </a:ext>
+              <a:ext uri="{96DAC541-7B7A-43D3-8B79-37D633B846F1}">
+                <asvg:svgBlip xmlns:asvg="http://schemas.microsoft.com/office/drawing/2016/SVG/main" r:embed="rId3"/>
+              </a:ext>
+            </a:extLst>
+          </a:blip>
+          <a:stretch>
+            <a:fillRect/>
+          </a:stretch>
+        </p:blipFill>
+        <p:spPr>
+          <a:xfrm>
+            <a:off x="165599" y="1427470"/>
+            <a:ext cx="914400" cy="914400"/>
+          </a:xfrm>
+          <a:prstGeom prst="rect">
+            <a:avLst/>
+          </a:prstGeom>
+        </p:spPr>
+      </p:pic>
+    </p:spTree>
+    <p:extLst>
+      <p:ext uri="{BB962C8B-B14F-4D97-AF65-F5344CB8AC3E}">
+        <p14:creationId xmlns:p14="http://schemas.microsoft.com/office/powerpoint/2010/main" val="3006018686"/>
+      </p:ext>
+    </p:extLst>
+  </p:cSld>
+  <p:clrMapOvr>
+    <a:masterClrMapping/>
+  </p:clrMapOvr>
+</p:sld>
+</file>
+
+<file path=ppt/slides/slide21.xml><?xml version="1.0" encoding="utf-8"?>
+<p:sld xmlns:a="http://schemas.openxmlformats.org/drawingml/2006/main" xmlns:r="http://schemas.openxmlformats.org/officeDocument/2006/relationships" xmlns:p="http://schemas.openxmlformats.org/presentationml/2006/main">
+  <p:cSld>
+    <p:spTree>
+      <p:nvGrpSpPr>
+        <p:cNvPr id="1" name=""/>
+        <p:cNvGrpSpPr/>
+        <p:nvPr/>
+      </p:nvGrpSpPr>
+      <p:grpSpPr>
+        <a:xfrm>
+          <a:off x="0" y="0"/>
+          <a:ext cx="0" cy="0"/>
+          <a:chOff x="0" y="0"/>
+          <a:chExt cx="0" cy="0"/>
+        </a:xfrm>
+      </p:grpSpPr>
+      <p:sp>
+        <p:nvSpPr>
+          <p:cNvPr id="2" name="Nadpis 1">
+            <a:extLst>
+              <a:ext uri="{FF2B5EF4-FFF2-40B4-BE49-F238E27FC236}">
+                <a16:creationId xmlns:a16="http://schemas.microsoft.com/office/drawing/2014/main" id="{E081B52C-DD40-471F-95B8-93DC30607D4F}"/>
+              </a:ext>
+            </a:extLst>
+          </p:cNvPr>
+          <p:cNvSpPr>
+            <a:spLocks noGrp="1"/>
+          </p:cNvSpPr>
+          <p:nvPr>
+            <p:ph type="ctrTitle"/>
+          </p:nvPr>
+        </p:nvSpPr>
+        <p:spPr/>
+        <p:txBody>
+          <a:bodyPr/>
+          <a:lstStyle/>
+          <a:p>
+            <a:pPr algn="ctr"/>
+            <a:r>
+              <a:rPr lang="cs-CZ" dirty="0"/>
+              <a:t>Konec části I.</a:t>
+            </a:r>
+          </a:p>
+        </p:txBody>
+      </p:sp>
+      <p:sp>
+        <p:nvSpPr>
+          <p:cNvPr id="3" name="Podnadpis 2">
+            <a:extLst>
+              <a:ext uri="{FF2B5EF4-FFF2-40B4-BE49-F238E27FC236}">
+                <a16:creationId xmlns:a16="http://schemas.microsoft.com/office/drawing/2014/main" id="{C4658D4A-355F-428E-83F7-CA2062E8C356}"/>
+              </a:ext>
+            </a:extLst>
+          </p:cNvPr>
+          <p:cNvSpPr>
+            <a:spLocks noGrp="1"/>
+          </p:cNvSpPr>
+          <p:nvPr>
+            <p:ph type="subTitle" idx="1"/>
+          </p:nvPr>
+        </p:nvSpPr>
+        <p:spPr/>
+        <p:txBody>
+          <a:bodyPr/>
+          <a:lstStyle/>
+          <a:p>
+            <a:pPr algn="ctr"/>
+            <a:r>
+              <a:rPr lang="cs-CZ" sz="3200" dirty="0"/>
+              <a:t>Děkuji za pozornost</a:t>
+            </a:r>
+          </a:p>
+          <a:p>
+            <a:pPr algn="ctr"/>
+            <a:r>
+              <a:rPr lang="cs-CZ" sz="2800" dirty="0"/>
+              <a:t>Dotazy?</a:t>
+            </a:r>
+          </a:p>
+        </p:txBody>
+      </p:sp>
+    </p:spTree>
+    <p:extLst>
+      <p:ext uri="{BB962C8B-B14F-4D97-AF65-F5344CB8AC3E}">
+        <p14:creationId xmlns:p14="http://schemas.microsoft.com/office/powerpoint/2010/main" val="542483529"/>
       </p:ext>
     </p:extLst>
   </p:cSld>
@@ -5575,22 +5951,47 @@
           </a:xfrm>
         </p:spPr>
         <p:txBody>
-          <a:bodyPr/>
+          <a:bodyPr>
+            <a:normAutofit fontScale="92500" lnSpcReduction="10000"/>
+          </a:bodyPr>
           <a:lstStyle/>
           <a:p>
             <a:r>
               <a:rPr lang="cs-CZ" dirty="0"/>
               <a:t>Definice</a:t>
             </a:r>
-          </a:p>
-          <a:p>
+            <a:endParaRPr lang="en-US" dirty="0"/>
+          </a:p>
+          <a:p>
+            <a:pPr marL="342900" indent="-342900">
+              <a:buFont typeface="Arial" panose="020B0604020202020204" pitchFamily="34" charset="0"/>
+              <a:buChar char="•"/>
+            </a:pPr>
+            <a:r>
+              <a:rPr lang="en-US" dirty="0"/>
+              <a:t>Cyber-Physical Systems (CPS) is defined as transformative technologies for managing interconnected systems between its physical assets and computational capabilities.</a:t>
+            </a:r>
+          </a:p>
+          <a:p>
+            <a:pPr marL="342900" indent="-342900">
+              <a:buFont typeface="Arial" panose="020B0604020202020204" pitchFamily="34" charset="0"/>
+              <a:buChar char="•"/>
+            </a:pPr>
+            <a:r>
+              <a:rPr lang="en-US" dirty="0"/>
+              <a:t>The term cyber-physical systems (CPS) refers to a new generation of systems with integrated computational and physical capabilities that can interact with humans through many new modalities.</a:t>
+            </a:r>
+          </a:p>
+          <a:p>
+            <a:pPr marL="342900" indent="-342900">
+              <a:buFont typeface="Arial" panose="020B0604020202020204" pitchFamily="34" charset="0"/>
+              <a:buChar char="•"/>
+            </a:pPr>
+            <a:r>
+              <a:rPr lang="en-US" dirty="0"/>
+              <a:t>Cyber-physical systems (CPS) are physical and engineered systems whose operations are monitored, coordinated, controlled and integrated by a computing and communication core.</a:t>
+            </a:r>
             <a:endParaRPr lang="cs-CZ" dirty="0"/>
-          </a:p>
-          <a:p>
-            <a:r>
-              <a:rPr lang="cs-CZ" dirty="0"/>
-              <a:t>Příklady</a:t>
-            </a:r>
           </a:p>
         </p:txBody>
       </p:sp>
@@ -5685,75 +6086,61 @@
           <a:lstStyle/>
           <a:p>
             <a:r>
-              <a:rPr lang="cs-CZ" dirty="0"/>
-              <a:t>Modelování </a:t>
+              <a:rPr lang="en-US" dirty="0" err="1"/>
+              <a:t>Kyber-fyzik</a:t>
             </a:r>
             <a:r>
               <a:rPr lang="cs-CZ" dirty="0" err="1"/>
-              <a:t>Kyber</a:t>
-            </a:r>
-            <a:r>
-              <a:rPr lang="cs-CZ" dirty="0"/>
-              <a:t>-fyzikálních systémů</a:t>
-            </a:r>
-          </a:p>
-        </p:txBody>
-      </p:sp>
-      <p:sp>
-        <p:nvSpPr>
-          <p:cNvPr id="3" name="Zástupný symbol pro obsah 2">
-            <a:extLst>
-              <a:ext uri="{FF2B5EF4-FFF2-40B4-BE49-F238E27FC236}">
-                <a16:creationId xmlns:a16="http://schemas.microsoft.com/office/drawing/2014/main" id="{DB240D0B-819A-4F36-BBEB-1F5FA397B0CD}"/>
-              </a:ext>
-            </a:extLst>
-          </p:cNvPr>
-          <p:cNvSpPr>
-            <a:spLocks noGrp="1"/>
-          </p:cNvSpPr>
+              <a:t>ální</a:t>
+            </a:r>
+            <a:r>
+              <a:rPr lang="cs-CZ" dirty="0"/>
+              <a:t> systémy</a:t>
+            </a:r>
+          </a:p>
+        </p:txBody>
+      </p:sp>
+      <p:pic>
+        <p:nvPicPr>
+          <p:cNvPr id="6" name="Zástupný symbol pro obsah 5">
+            <a:extLst>
+              <a:ext uri="{FF2B5EF4-FFF2-40B4-BE49-F238E27FC236}">
+                <a16:creationId xmlns:a16="http://schemas.microsoft.com/office/drawing/2014/main" id="{B835FBDC-A22A-4382-AF0B-98CB51455527}"/>
+              </a:ext>
+            </a:extLst>
+          </p:cNvPr>
+          <p:cNvPicPr>
+            <a:picLocks noGrp="1" noChangeAspect="1"/>
+          </p:cNvPicPr>
           <p:nvPr>
             <p:ph idx="1"/>
           </p:nvPr>
-        </p:nvSpPr>
-        <p:spPr>
-          <a:xfrm>
-            <a:off x="1079999" y="3059766"/>
-            <a:ext cx="7794000" cy="3528000"/>
-          </a:xfrm>
-        </p:spPr>
-        <p:txBody>
-          <a:bodyPr/>
-          <a:lstStyle/>
-          <a:p>
-            <a:r>
-              <a:rPr lang="cs-CZ" dirty="0"/>
-              <a:t>Model </a:t>
-            </a:r>
-            <a:r>
-              <a:rPr lang="cs-CZ" dirty="0" err="1"/>
-              <a:t>driven</a:t>
-            </a:r>
-            <a:r>
-              <a:rPr lang="cs-CZ" dirty="0"/>
-              <a:t> </a:t>
-            </a:r>
-            <a:r>
-              <a:rPr lang="cs-CZ" dirty="0" err="1"/>
-              <a:t>developement</a:t>
-            </a:r>
-            <a:endParaRPr lang="cs-CZ" dirty="0"/>
-          </a:p>
-          <a:p>
-            <a:endParaRPr lang="cs-CZ" dirty="0"/>
-          </a:p>
-        </p:txBody>
-      </p:sp>
+        </p:nvPicPr>
+        <p:blipFill>
+          <a:blip r:embed="rId2">
+            <a:extLst>
+              <a:ext uri="{28A0092B-C50C-407E-A947-70E740481C1C}">
+                <a14:useLocalDpi xmlns:a14="http://schemas.microsoft.com/office/drawing/2010/main" val="0"/>
+              </a:ext>
+            </a:extLst>
+          </a:blip>
+          <a:stretch>
+            <a:fillRect/>
+          </a:stretch>
+        </p:blipFill>
+        <p:spPr>
+          <a:xfrm>
+            <a:off x="1193089" y="2887934"/>
+            <a:ext cx="6757821" cy="3409768"/>
+          </a:xfrm>
+        </p:spPr>
+      </p:pic>
       <p:pic>
         <p:nvPicPr>
-          <p:cNvPr id="8" name="Grafický objekt 7" descr="Síť">
-            <a:extLst>
-              <a:ext uri="{FF2B5EF4-FFF2-40B4-BE49-F238E27FC236}">
-                <a16:creationId xmlns:a16="http://schemas.microsoft.com/office/drawing/2014/main" id="{2C544BB0-C07E-478B-A808-F225DDA180B4}"/>
+          <p:cNvPr id="5" name="Grafický objekt 4" descr="Přehrávač DVD">
+            <a:extLst>
+              <a:ext uri="{FF2B5EF4-FFF2-40B4-BE49-F238E27FC236}">
+                <a16:creationId xmlns:a16="http://schemas.microsoft.com/office/drawing/2014/main" id="{1C05C4EF-711C-4C62-92EC-A28B5A39F975}"/>
               </a:ext>
             </a:extLst>
           </p:cNvPr>
@@ -5763,13 +6150,13 @@
           <p:nvPr/>
         </p:nvPicPr>
         <p:blipFill>
-          <a:blip r:embed="rId2">
+          <a:blip r:embed="rId3">
             <a:extLst>
               <a:ext uri="{28A0092B-C50C-407E-A947-70E740481C1C}">
                 <a14:useLocalDpi xmlns:a14="http://schemas.microsoft.com/office/drawing/2010/main" val="0"/>
               </a:ext>
               <a:ext uri="{96DAC541-7B7A-43D3-8B79-37D633B846F1}">
-                <asvg:svgBlip xmlns:asvg="http://schemas.microsoft.com/office/drawing/2016/SVG/main" r:embed="rId3"/>
+                <asvg:svgBlip xmlns:asvg="http://schemas.microsoft.com/office/drawing/2016/SVG/main" r:embed="rId4"/>
               </a:ext>
             </a:extLst>
           </a:blip>
@@ -5779,7 +6166,7 @@
         </p:blipFill>
         <p:spPr>
           <a:xfrm>
-            <a:off x="165599" y="1429567"/>
+            <a:off x="165599" y="1628168"/>
             <a:ext cx="914400" cy="914400"/>
           </a:xfrm>
           <a:prstGeom prst="rect">
@@ -5790,7 +6177,7 @@
     </p:spTree>
     <p:extLst>
       <p:ext uri="{BB962C8B-B14F-4D97-AF65-F5344CB8AC3E}">
-        <p14:creationId xmlns:p14="http://schemas.microsoft.com/office/powerpoint/2010/main" val="498899578"/>
+        <p14:creationId xmlns:p14="http://schemas.microsoft.com/office/powerpoint/2010/main" val="989347130"/>
       </p:ext>
     </p:extLst>
   </p:cSld>

</xml_diff>